<commit_message>
syllabus and reading updates to reflect reality
</commit_message>
<xml_diff>
--- a/docs/slides/01-WhyCryptosystemsFail.pptx
+++ b/docs/slides/01-WhyCryptosystemsFail.pptx
@@ -5,7 +5,7 @@
     <p:sldMasterId id="2147483648" r:id="rId1"/>
   </p:sldMasterIdLst>
   <p:notesMasterIdLst>
-    <p:notesMasterId r:id="rId22"/>
+    <p:notesMasterId r:id="rId24"/>
   </p:notesMasterIdLst>
   <p:sldIdLst>
     <p:sldId id="256" r:id="rId2"/>
@@ -17,17 +17,19 @@
     <p:sldId id="275" r:id="rId8"/>
     <p:sldId id="260" r:id="rId9"/>
     <p:sldId id="261" r:id="rId10"/>
-    <p:sldId id="262" r:id="rId11"/>
-    <p:sldId id="263" r:id="rId12"/>
-    <p:sldId id="264" r:id="rId13"/>
-    <p:sldId id="265" r:id="rId14"/>
-    <p:sldId id="266" r:id="rId15"/>
-    <p:sldId id="267" r:id="rId16"/>
-    <p:sldId id="273" r:id="rId17"/>
-    <p:sldId id="272" r:id="rId18"/>
-    <p:sldId id="270" r:id="rId19"/>
-    <p:sldId id="269" r:id="rId20"/>
-    <p:sldId id="274" r:id="rId21"/>
+    <p:sldId id="277" r:id="rId11"/>
+    <p:sldId id="276" r:id="rId12"/>
+    <p:sldId id="262" r:id="rId13"/>
+    <p:sldId id="263" r:id="rId14"/>
+    <p:sldId id="264" r:id="rId15"/>
+    <p:sldId id="265" r:id="rId16"/>
+    <p:sldId id="266" r:id="rId17"/>
+    <p:sldId id="267" r:id="rId18"/>
+    <p:sldId id="273" r:id="rId19"/>
+    <p:sldId id="272" r:id="rId20"/>
+    <p:sldId id="270" r:id="rId21"/>
+    <p:sldId id="269" r:id="rId22"/>
+    <p:sldId id="274" r:id="rId23"/>
   </p:sldIdLst>
   <p:sldSz cx="9144000" cy="5143500" type="screen16x9"/>
   <p:notesSz cx="6858000" cy="9144000"/>
@@ -227,7 +229,7 @@
           <a:p>
             <a:fld id="{F44A23D4-3D2D-C540-B83F-A1A151C575CB}" type="datetimeFigureOut">
               <a:rPr lang="en-US" smtClean="0"/>
-              <a:t>1/12/22</a:t>
+              <a:t>1/9/23</a:t>
             </a:fld>
             <a:endParaRPr lang="en-US"/>
           </a:p>
@@ -729,315 +731,6 @@
           <a:bodyPr/>
           <a:lstStyle/>
           <a:p>
-            <a:r>
-              <a:rPr lang="en-US" sz="1200" b="0" i="0" kern="1200" dirty="0">
-                <a:solidFill>
-                  <a:schemeClr val="tx1"/>
-                </a:solidFill>
-                <a:effectLst/>
-                <a:latin typeface="+mn-lt"/>
-                <a:ea typeface="+mn-ea"/>
-                <a:cs typeface="+mn-cs"/>
-              </a:rPr>
-              <a:t>The data breach into Equifax was principally through a third-party software exploit that had been patched, and Equifax failed to update their servers with it. Equifax had been using the open-source </a:t>
-            </a:r>
-            <a:r>
-              <a:rPr lang="en-US" sz="1200" b="0" i="0" u="none" strike="noStrike" kern="1200" dirty="0">
-                <a:solidFill>
-                  <a:schemeClr val="tx1"/>
-                </a:solidFill>
-                <a:effectLst/>
-                <a:latin typeface="+mn-lt"/>
-                <a:ea typeface="+mn-ea"/>
-                <a:cs typeface="+mn-cs"/>
-                <a:hlinkClick r:id="rId3" tooltip="Apache Struts 2"/>
-              </a:rPr>
-              <a:t>Apache Struts</a:t>
-            </a:r>
-            <a:r>
-              <a:rPr lang="en-US" sz="1200" b="0" i="0" kern="1200" dirty="0">
-                <a:solidFill>
-                  <a:schemeClr val="tx1"/>
-                </a:solidFill>
-                <a:effectLst/>
-                <a:latin typeface="+mn-lt"/>
-                <a:ea typeface="+mn-ea"/>
-                <a:cs typeface="+mn-cs"/>
-              </a:rPr>
-              <a:t> as its website framework for systems handling credit disputes from consumers. A key security patch for Apache Struts was released on March 7, 2017 after a security exploit was found and all users of the framework were urged to update immediately.</a:t>
-            </a:r>
-            <a:r>
-              <a:rPr lang="en-US" sz="1200" b="0" i="0" u="none" strike="noStrike" kern="1200" baseline="30000" dirty="0">
-                <a:solidFill>
-                  <a:schemeClr val="tx1"/>
-                </a:solidFill>
-                <a:effectLst/>
-                <a:latin typeface="+mn-lt"/>
-                <a:ea typeface="+mn-ea"/>
-                <a:cs typeface="+mn-cs"/>
-                <a:hlinkClick r:id="rId4"/>
-              </a:rPr>
-              <a:t>[3]</a:t>
-            </a:r>
-            <a:r>
-              <a:rPr lang="en-US" sz="1200" b="0" i="0" kern="1200" dirty="0">
-                <a:solidFill>
-                  <a:schemeClr val="tx1"/>
-                </a:solidFill>
-                <a:effectLst/>
-                <a:latin typeface="+mn-lt"/>
-                <a:ea typeface="+mn-ea"/>
-                <a:cs typeface="+mn-cs"/>
-              </a:rPr>
-              <a:t> Security experts found an unknown hacking group trying to find websites that had failed to update Struts as early as March 10, 2017 as to find a system to exploit.</a:t>
-            </a:r>
-            <a:r>
-              <a:rPr lang="en-US" sz="1200" b="0" i="0" u="none" strike="noStrike" kern="1200" baseline="30000" dirty="0">
-                <a:solidFill>
-                  <a:schemeClr val="tx1"/>
-                </a:solidFill>
-                <a:effectLst/>
-                <a:latin typeface="+mn-lt"/>
-                <a:ea typeface="+mn-ea"/>
-                <a:cs typeface="+mn-cs"/>
-                <a:hlinkClick r:id="rId5"/>
-              </a:rPr>
-              <a:t>[4]</a:t>
-            </a:r>
-            <a:endParaRPr lang="en-US" sz="1200" b="0" i="0" kern="1200" dirty="0">
-              <a:solidFill>
-                <a:schemeClr val="tx1"/>
-              </a:solidFill>
-              <a:effectLst/>
-              <a:latin typeface="+mn-lt"/>
-              <a:ea typeface="+mn-ea"/>
-              <a:cs typeface="+mn-cs"/>
-            </a:endParaRPr>
-          </a:p>
-          <a:p>
-            <a:endParaRPr lang="en-US" sz="1200" b="0" i="0" kern="1200" dirty="0">
-              <a:solidFill>
-                <a:schemeClr val="tx1"/>
-              </a:solidFill>
-              <a:effectLst/>
-              <a:latin typeface="+mn-lt"/>
-              <a:ea typeface="+mn-ea"/>
-              <a:cs typeface="+mn-cs"/>
-            </a:endParaRPr>
-          </a:p>
-          <a:p>
-            <a:r>
-              <a:rPr lang="en-US" sz="1200" b="0" i="0" kern="1200" dirty="0">
-                <a:solidFill>
-                  <a:schemeClr val="tx1"/>
-                </a:solidFill>
-                <a:effectLst/>
-                <a:latin typeface="+mn-lt"/>
-                <a:ea typeface="+mn-ea"/>
-                <a:cs typeface="+mn-cs"/>
-              </a:rPr>
-              <a:t>The </a:t>
-            </a:r>
-            <a:r>
-              <a:rPr lang="en-US" sz="1200" b="1" i="0" kern="1200" dirty="0">
-                <a:solidFill>
-                  <a:schemeClr val="tx1"/>
-                </a:solidFill>
-                <a:effectLst/>
-                <a:latin typeface="+mn-lt"/>
-                <a:ea typeface="+mn-ea"/>
-                <a:cs typeface="+mn-cs"/>
-              </a:rPr>
-              <a:t>Equifax data breach</a:t>
-            </a:r>
-            <a:r>
-              <a:rPr lang="en-US" sz="1200" b="0" i="0" kern="1200" dirty="0">
-                <a:solidFill>
-                  <a:schemeClr val="tx1"/>
-                </a:solidFill>
-                <a:effectLst/>
-                <a:latin typeface="+mn-lt"/>
-                <a:ea typeface="+mn-ea"/>
-                <a:cs typeface="+mn-cs"/>
-              </a:rPr>
-              <a:t> occurred between May and July 2017 at the American </a:t>
-            </a:r>
-            <a:r>
-              <a:rPr lang="en-US" sz="1200" b="0" i="0" u="none" strike="noStrike" kern="1200" dirty="0">
-                <a:solidFill>
-                  <a:schemeClr val="tx1"/>
-                </a:solidFill>
-                <a:effectLst/>
-                <a:latin typeface="+mn-lt"/>
-                <a:ea typeface="+mn-ea"/>
-                <a:cs typeface="+mn-cs"/>
-                <a:hlinkClick r:id="rId6" tooltip="Credit bureau"/>
-              </a:rPr>
-              <a:t>credit bureau</a:t>
-            </a:r>
-            <a:r>
-              <a:rPr lang="en-US" sz="1200" b="0" i="0" kern="1200" dirty="0">
-                <a:solidFill>
-                  <a:schemeClr val="tx1"/>
-                </a:solidFill>
-                <a:effectLst/>
-                <a:latin typeface="+mn-lt"/>
-                <a:ea typeface="+mn-ea"/>
-                <a:cs typeface="+mn-cs"/>
-              </a:rPr>
-              <a:t> </a:t>
-            </a:r>
-            <a:r>
-              <a:rPr lang="en-US" sz="1200" b="0" i="0" u="none" strike="noStrike" kern="1200" dirty="0">
-                <a:solidFill>
-                  <a:schemeClr val="tx1"/>
-                </a:solidFill>
-                <a:effectLst/>
-                <a:latin typeface="+mn-lt"/>
-                <a:ea typeface="+mn-ea"/>
-                <a:cs typeface="+mn-cs"/>
-                <a:hlinkClick r:id="rId7" tooltip="Equifax"/>
-              </a:rPr>
-              <a:t>Equifax</a:t>
-            </a:r>
-            <a:r>
-              <a:rPr lang="en-US" sz="1200" b="0" i="0" kern="1200" dirty="0">
-                <a:solidFill>
-                  <a:schemeClr val="tx1"/>
-                </a:solidFill>
-                <a:effectLst/>
-                <a:latin typeface="+mn-lt"/>
-                <a:ea typeface="+mn-ea"/>
-                <a:cs typeface="+mn-cs"/>
-              </a:rPr>
-              <a:t>. Private records of 147.9 million Americans along with 15.2 million British citizens and about 19,000 Canadian citizens were compromised in the breach, making it one of the largest cybercrimes related to identity theft. In a settlement with the </a:t>
-            </a:r>
-            <a:r>
-              <a:rPr lang="en-US" sz="1200" b="0" i="0" u="none" strike="noStrike" kern="1200" dirty="0">
-                <a:solidFill>
-                  <a:schemeClr val="tx1"/>
-                </a:solidFill>
-                <a:effectLst/>
-                <a:latin typeface="+mn-lt"/>
-                <a:ea typeface="+mn-ea"/>
-                <a:cs typeface="+mn-cs"/>
-                <a:hlinkClick r:id="rId8" tooltip="United States Federal Trade Commission"/>
-              </a:rPr>
-              <a:t>United States Federal Trade Commission</a:t>
-            </a:r>
-            <a:r>
-              <a:rPr lang="en-US" sz="1200" b="0" i="0" kern="1200" dirty="0">
-                <a:solidFill>
-                  <a:schemeClr val="tx1"/>
-                </a:solidFill>
-                <a:effectLst/>
-                <a:latin typeface="+mn-lt"/>
-                <a:ea typeface="+mn-ea"/>
-                <a:cs typeface="+mn-cs"/>
-              </a:rPr>
-              <a:t>, Equifax offered affected users settlement funds and free credit monitoring.</a:t>
-            </a:r>
-          </a:p>
-          <a:p>
-            <a:r>
-              <a:rPr lang="en-US" sz="1200" b="0" i="0" kern="1200" dirty="0">
-                <a:solidFill>
-                  <a:schemeClr val="tx1"/>
-                </a:solidFill>
-                <a:effectLst/>
-                <a:latin typeface="+mn-lt"/>
-                <a:ea typeface="+mn-ea"/>
-                <a:cs typeface="+mn-cs"/>
-              </a:rPr>
-              <a:t>In February 2020, the United States government indicted members of China's </a:t>
-            </a:r>
-            <a:r>
-              <a:rPr lang="en-US" sz="1200" b="0" i="0" u="none" strike="noStrike" kern="1200" dirty="0">
-                <a:solidFill>
-                  <a:schemeClr val="tx1"/>
-                </a:solidFill>
-                <a:effectLst/>
-                <a:latin typeface="+mn-lt"/>
-                <a:ea typeface="+mn-ea"/>
-                <a:cs typeface="+mn-cs"/>
-                <a:hlinkClick r:id="rId9" tooltip="People's Liberation Army"/>
-              </a:rPr>
-              <a:t>People's Liberation Army</a:t>
-            </a:r>
-            <a:r>
-              <a:rPr lang="en-US" sz="1200" b="0" i="0" kern="1200" dirty="0">
-                <a:solidFill>
-                  <a:schemeClr val="tx1"/>
-                </a:solidFill>
-                <a:effectLst/>
-                <a:latin typeface="+mn-lt"/>
-                <a:ea typeface="+mn-ea"/>
-                <a:cs typeface="+mn-cs"/>
-              </a:rPr>
-              <a:t> for hacking into Equifax and plundering sensitive data as part of a massive heist that also included stealing trade secrets, though the </a:t>
-            </a:r>
-            <a:r>
-              <a:rPr lang="en-US" sz="1200" b="0" i="0" u="none" strike="noStrike" kern="1200" dirty="0">
-                <a:solidFill>
-                  <a:schemeClr val="tx1"/>
-                </a:solidFill>
-                <a:effectLst/>
-                <a:latin typeface="+mn-lt"/>
-                <a:ea typeface="+mn-ea"/>
-                <a:cs typeface="+mn-cs"/>
-                <a:hlinkClick r:id="rId10" tooltip="Chinese Communist Party"/>
-              </a:rPr>
-              <a:t>Chinese Communist Party</a:t>
-            </a:r>
-            <a:r>
-              <a:rPr lang="en-US" sz="1200" b="0" i="0" kern="1200" dirty="0">
-                <a:solidFill>
-                  <a:schemeClr val="tx1"/>
-                </a:solidFill>
-                <a:effectLst/>
-                <a:latin typeface="+mn-lt"/>
-                <a:ea typeface="+mn-ea"/>
-                <a:cs typeface="+mn-cs"/>
-              </a:rPr>
-              <a:t> denied these claims.</a:t>
-            </a:r>
-            <a:r>
-              <a:rPr lang="en-US" sz="1200" b="0" i="0" u="none" strike="noStrike" kern="1200" baseline="30000" dirty="0">
-                <a:solidFill>
-                  <a:schemeClr val="tx1"/>
-                </a:solidFill>
-                <a:effectLst/>
-                <a:latin typeface="+mn-lt"/>
-                <a:ea typeface="+mn-ea"/>
-                <a:cs typeface="+mn-cs"/>
-                <a:hlinkClick r:id="rId11"/>
-              </a:rPr>
-              <a:t>[1]</a:t>
-            </a:r>
-            <a:r>
-              <a:rPr lang="en-US" sz="1200" b="0" i="0" u="none" strike="noStrike" kern="1200" baseline="30000" dirty="0">
-                <a:solidFill>
-                  <a:schemeClr val="tx1"/>
-                </a:solidFill>
-                <a:effectLst/>
-                <a:latin typeface="+mn-lt"/>
-                <a:ea typeface="+mn-ea"/>
-                <a:cs typeface="+mn-cs"/>
-                <a:hlinkClick r:id="rId12"/>
-              </a:rPr>
-              <a:t>[2]</a:t>
-            </a:r>
-            <a:endParaRPr lang="en-US" sz="1200" b="0" i="0" u="none" strike="noStrike" kern="1200" baseline="30000" dirty="0">
-              <a:solidFill>
-                <a:schemeClr val="tx1"/>
-              </a:solidFill>
-              <a:effectLst/>
-              <a:latin typeface="+mn-lt"/>
-              <a:ea typeface="+mn-ea"/>
-              <a:cs typeface="+mn-cs"/>
-            </a:endParaRPr>
-          </a:p>
-          <a:p>
             <a:endParaRPr lang="en-US" dirty="0"/>
           </a:p>
         </p:txBody>
@@ -1059,7 +752,7 @@
           <a:p>
             <a:fld id="{A0C2BAE8-E3F0-0946-96E1-DB73165E9F51}" type="slidenum">
               <a:rPr lang="en-US" smtClean="0"/>
-              <a:t>17</a:t>
+              <a:t>11</a:t>
             </a:fld>
             <a:endParaRPr lang="en-US"/>
           </a:p>
@@ -1068,7 +761,7 @@
     </p:spTree>
     <p:extLst>
       <p:ext uri="{BB962C8B-B14F-4D97-AF65-F5344CB8AC3E}">
-        <p14:creationId xmlns:p14="http://schemas.microsoft.com/office/powerpoint/2010/main" val="699651670"/>
+        <p14:creationId xmlns:p14="http://schemas.microsoft.com/office/powerpoint/2010/main" val="3164702888"/>
       </p:ext>
     </p:extLst>
   </p:cSld>
@@ -1122,6 +815,486 @@
           <a:bodyPr/>
           <a:lstStyle/>
           <a:p>
+            <a:r>
+              <a:rPr lang="en-US" dirty="0"/>
+              <a:t>Good point for debate.</a:t>
+            </a:r>
+          </a:p>
+        </p:txBody>
+      </p:sp>
+      <p:sp>
+        <p:nvSpPr>
+          <p:cNvPr id="4" name="Slide Number Placeholder 3"/>
+          <p:cNvSpPr>
+            <a:spLocks noGrp="1"/>
+          </p:cNvSpPr>
+          <p:nvPr>
+            <p:ph type="sldNum" sz="quarter" idx="5"/>
+          </p:nvPr>
+        </p:nvSpPr>
+        <p:spPr/>
+        <p:txBody>
+          <a:bodyPr/>
+          <a:lstStyle/>
+          <a:p>
+            <a:fld id="{A0C2BAE8-E3F0-0946-96E1-DB73165E9F51}" type="slidenum">
+              <a:rPr lang="en-US" smtClean="0"/>
+              <a:t>17</a:t>
+            </a:fld>
+            <a:endParaRPr lang="en-US"/>
+          </a:p>
+        </p:txBody>
+      </p:sp>
+    </p:spTree>
+    <p:extLst>
+      <p:ext uri="{BB962C8B-B14F-4D97-AF65-F5344CB8AC3E}">
+        <p14:creationId xmlns:p14="http://schemas.microsoft.com/office/powerpoint/2010/main" val="1381529233"/>
+      </p:ext>
+    </p:extLst>
+  </p:cSld>
+  <p:clrMapOvr>
+    <a:masterClrMapping/>
+  </p:clrMapOvr>
+</p:notes>
+</file>
+
+<file path=ppt/notesSlides/notesSlide5.xml><?xml version="1.0" encoding="utf-8"?>
+<p:notes xmlns:a="http://schemas.openxmlformats.org/drawingml/2006/main" xmlns:r="http://schemas.openxmlformats.org/officeDocument/2006/relationships" xmlns:p="http://schemas.openxmlformats.org/presentationml/2006/main">
+  <p:cSld>
+    <p:spTree>
+      <p:nvGrpSpPr>
+        <p:cNvPr id="1" name=""/>
+        <p:cNvGrpSpPr/>
+        <p:nvPr/>
+      </p:nvGrpSpPr>
+      <p:grpSpPr>
+        <a:xfrm>
+          <a:off x="0" y="0"/>
+          <a:ext cx="0" cy="0"/>
+          <a:chOff x="0" y="0"/>
+          <a:chExt cx="0" cy="0"/>
+        </a:xfrm>
+      </p:grpSpPr>
+      <p:sp>
+        <p:nvSpPr>
+          <p:cNvPr id="2" name="Slide Image Placeholder 1"/>
+          <p:cNvSpPr>
+            <a:spLocks noGrp="1" noRot="1" noChangeAspect="1"/>
+          </p:cNvSpPr>
+          <p:nvPr>
+            <p:ph type="sldImg"/>
+          </p:nvPr>
+        </p:nvSpPr>
+        <p:spPr/>
+      </p:sp>
+      <p:sp>
+        <p:nvSpPr>
+          <p:cNvPr id="3" name="Notes Placeholder 2"/>
+          <p:cNvSpPr>
+            <a:spLocks noGrp="1"/>
+          </p:cNvSpPr>
+          <p:nvPr>
+            <p:ph type="body" idx="1"/>
+          </p:nvPr>
+        </p:nvSpPr>
+        <p:spPr/>
+        <p:txBody>
+          <a:bodyPr/>
+          <a:lstStyle/>
+          <a:p>
+            <a:r>
+              <a:rPr lang="en-US" sz="1200" b="0" i="0" kern="1200" dirty="0">
+                <a:solidFill>
+                  <a:schemeClr val="tx1"/>
+                </a:solidFill>
+                <a:effectLst/>
+                <a:latin typeface="+mn-lt"/>
+                <a:ea typeface="+mn-ea"/>
+                <a:cs typeface="+mn-cs"/>
+              </a:rPr>
+              <a:t>The data breach into Equifax was principally through a third-party software exploit that had been patched, and Equifax failed to update their servers with it. Equifax had been using the open-source </a:t>
+            </a:r>
+            <a:r>
+              <a:rPr lang="en-US" sz="1200" b="0" i="0" u="none" strike="noStrike" kern="1200" dirty="0">
+                <a:solidFill>
+                  <a:schemeClr val="tx1"/>
+                </a:solidFill>
+                <a:effectLst/>
+                <a:latin typeface="+mn-lt"/>
+                <a:ea typeface="+mn-ea"/>
+                <a:cs typeface="+mn-cs"/>
+                <a:hlinkClick r:id="rId3" tooltip="Apache Struts 2"/>
+              </a:rPr>
+              <a:t>Apache Struts</a:t>
+            </a:r>
+            <a:r>
+              <a:rPr lang="en-US" sz="1200" b="0" i="0" kern="1200" dirty="0">
+                <a:solidFill>
+                  <a:schemeClr val="tx1"/>
+                </a:solidFill>
+                <a:effectLst/>
+                <a:latin typeface="+mn-lt"/>
+                <a:ea typeface="+mn-ea"/>
+                <a:cs typeface="+mn-cs"/>
+              </a:rPr>
+              <a:t> as its website framework for systems handling credit disputes from consumers. A key security patch for Apache Struts was released on March 7, 2017 after a security exploit was found and all users of the framework were urged to update immediately.</a:t>
+            </a:r>
+            <a:r>
+              <a:rPr lang="en-US" sz="1200" b="0" i="0" u="none" strike="noStrike" kern="1200" baseline="30000" dirty="0">
+                <a:solidFill>
+                  <a:schemeClr val="tx1"/>
+                </a:solidFill>
+                <a:effectLst/>
+                <a:latin typeface="+mn-lt"/>
+                <a:ea typeface="+mn-ea"/>
+                <a:cs typeface="+mn-cs"/>
+                <a:hlinkClick r:id="rId4"/>
+              </a:rPr>
+              <a:t>[3]</a:t>
+            </a:r>
+            <a:r>
+              <a:rPr lang="en-US" sz="1200" b="0" i="0" kern="1200" dirty="0">
+                <a:solidFill>
+                  <a:schemeClr val="tx1"/>
+                </a:solidFill>
+                <a:effectLst/>
+                <a:latin typeface="+mn-lt"/>
+                <a:ea typeface="+mn-ea"/>
+                <a:cs typeface="+mn-cs"/>
+              </a:rPr>
+              <a:t> Security experts found an unknown hacking group trying to find websites that had failed to update Struts as early as March 10, 2017 as to find a system to exploit.</a:t>
+            </a:r>
+            <a:r>
+              <a:rPr lang="en-US" sz="1200" b="0" i="0" u="none" strike="noStrike" kern="1200" baseline="30000" dirty="0">
+                <a:solidFill>
+                  <a:schemeClr val="tx1"/>
+                </a:solidFill>
+                <a:effectLst/>
+                <a:latin typeface="+mn-lt"/>
+                <a:ea typeface="+mn-ea"/>
+                <a:cs typeface="+mn-cs"/>
+                <a:hlinkClick r:id="rId5"/>
+              </a:rPr>
+              <a:t>[4]</a:t>
+            </a:r>
+            <a:endParaRPr lang="en-US" sz="1200" b="0" i="0" kern="1200" dirty="0">
+              <a:solidFill>
+                <a:schemeClr val="tx1"/>
+              </a:solidFill>
+              <a:effectLst/>
+              <a:latin typeface="+mn-lt"/>
+              <a:ea typeface="+mn-ea"/>
+              <a:cs typeface="+mn-cs"/>
+            </a:endParaRPr>
+          </a:p>
+          <a:p>
+            <a:endParaRPr lang="en-US" sz="1200" b="0" i="0" kern="1200" dirty="0">
+              <a:solidFill>
+                <a:schemeClr val="tx1"/>
+              </a:solidFill>
+              <a:effectLst/>
+              <a:latin typeface="+mn-lt"/>
+              <a:ea typeface="+mn-ea"/>
+              <a:cs typeface="+mn-cs"/>
+            </a:endParaRPr>
+          </a:p>
+          <a:p>
+            <a:r>
+              <a:rPr lang="en-US" sz="1200" b="0" i="0" kern="1200" dirty="0">
+                <a:solidFill>
+                  <a:schemeClr val="tx1"/>
+                </a:solidFill>
+                <a:effectLst/>
+                <a:latin typeface="+mn-lt"/>
+                <a:ea typeface="+mn-ea"/>
+                <a:cs typeface="+mn-cs"/>
+              </a:rPr>
+              <a:t>The </a:t>
+            </a:r>
+            <a:r>
+              <a:rPr lang="en-US" sz="1200" b="1" i="0" kern="1200" dirty="0">
+                <a:solidFill>
+                  <a:schemeClr val="tx1"/>
+                </a:solidFill>
+                <a:effectLst/>
+                <a:latin typeface="+mn-lt"/>
+                <a:ea typeface="+mn-ea"/>
+                <a:cs typeface="+mn-cs"/>
+              </a:rPr>
+              <a:t>Equifax data breach</a:t>
+            </a:r>
+            <a:r>
+              <a:rPr lang="en-US" sz="1200" b="0" i="0" kern="1200" dirty="0">
+                <a:solidFill>
+                  <a:schemeClr val="tx1"/>
+                </a:solidFill>
+                <a:effectLst/>
+                <a:latin typeface="+mn-lt"/>
+                <a:ea typeface="+mn-ea"/>
+                <a:cs typeface="+mn-cs"/>
+              </a:rPr>
+              <a:t> occurred between May and July 2017 at the American </a:t>
+            </a:r>
+            <a:r>
+              <a:rPr lang="en-US" sz="1200" b="0" i="0" u="none" strike="noStrike" kern="1200" dirty="0">
+                <a:solidFill>
+                  <a:schemeClr val="tx1"/>
+                </a:solidFill>
+                <a:effectLst/>
+                <a:latin typeface="+mn-lt"/>
+                <a:ea typeface="+mn-ea"/>
+                <a:cs typeface="+mn-cs"/>
+                <a:hlinkClick r:id="rId6" tooltip="Credit bureau"/>
+              </a:rPr>
+              <a:t>credit bureau</a:t>
+            </a:r>
+            <a:r>
+              <a:rPr lang="en-US" sz="1200" b="0" i="0" kern="1200" dirty="0">
+                <a:solidFill>
+                  <a:schemeClr val="tx1"/>
+                </a:solidFill>
+                <a:effectLst/>
+                <a:latin typeface="+mn-lt"/>
+                <a:ea typeface="+mn-ea"/>
+                <a:cs typeface="+mn-cs"/>
+              </a:rPr>
+              <a:t> </a:t>
+            </a:r>
+            <a:r>
+              <a:rPr lang="en-US" sz="1200" b="0" i="0" u="none" strike="noStrike" kern="1200" dirty="0">
+                <a:solidFill>
+                  <a:schemeClr val="tx1"/>
+                </a:solidFill>
+                <a:effectLst/>
+                <a:latin typeface="+mn-lt"/>
+                <a:ea typeface="+mn-ea"/>
+                <a:cs typeface="+mn-cs"/>
+                <a:hlinkClick r:id="rId7" tooltip="Equifax"/>
+              </a:rPr>
+              <a:t>Equifax</a:t>
+            </a:r>
+            <a:r>
+              <a:rPr lang="en-US" sz="1200" b="0" i="0" kern="1200" dirty="0">
+                <a:solidFill>
+                  <a:schemeClr val="tx1"/>
+                </a:solidFill>
+                <a:effectLst/>
+                <a:latin typeface="+mn-lt"/>
+                <a:ea typeface="+mn-ea"/>
+                <a:cs typeface="+mn-cs"/>
+              </a:rPr>
+              <a:t>. Private records of 147.9 million Americans along with 15.2 million British citizens and about 19,000 Canadian citizens were compromised in the breach, making it one of the largest cybercrimes related to identity theft. In a settlement with the </a:t>
+            </a:r>
+            <a:r>
+              <a:rPr lang="en-US" sz="1200" b="0" i="0" u="none" strike="noStrike" kern="1200" dirty="0">
+                <a:solidFill>
+                  <a:schemeClr val="tx1"/>
+                </a:solidFill>
+                <a:effectLst/>
+                <a:latin typeface="+mn-lt"/>
+                <a:ea typeface="+mn-ea"/>
+                <a:cs typeface="+mn-cs"/>
+                <a:hlinkClick r:id="rId8" tooltip="United States Federal Trade Commission"/>
+              </a:rPr>
+              <a:t>United States Federal Trade Commission</a:t>
+            </a:r>
+            <a:r>
+              <a:rPr lang="en-US" sz="1200" b="0" i="0" kern="1200" dirty="0">
+                <a:solidFill>
+                  <a:schemeClr val="tx1"/>
+                </a:solidFill>
+                <a:effectLst/>
+                <a:latin typeface="+mn-lt"/>
+                <a:ea typeface="+mn-ea"/>
+                <a:cs typeface="+mn-cs"/>
+              </a:rPr>
+              <a:t>, Equifax offered affected users settlement funds and free credit monitoring.</a:t>
+            </a:r>
+          </a:p>
+          <a:p>
+            <a:r>
+              <a:rPr lang="en-US" sz="1200" b="0" i="0" kern="1200" dirty="0">
+                <a:solidFill>
+                  <a:schemeClr val="tx1"/>
+                </a:solidFill>
+                <a:effectLst/>
+                <a:latin typeface="+mn-lt"/>
+                <a:ea typeface="+mn-ea"/>
+                <a:cs typeface="+mn-cs"/>
+              </a:rPr>
+              <a:t>In February 2020, the United States government indicted members of China's </a:t>
+            </a:r>
+            <a:r>
+              <a:rPr lang="en-US" sz="1200" b="0" i="0" u="none" strike="noStrike" kern="1200" dirty="0">
+                <a:solidFill>
+                  <a:schemeClr val="tx1"/>
+                </a:solidFill>
+                <a:effectLst/>
+                <a:latin typeface="+mn-lt"/>
+                <a:ea typeface="+mn-ea"/>
+                <a:cs typeface="+mn-cs"/>
+                <a:hlinkClick r:id="rId9" tooltip="People's Liberation Army"/>
+              </a:rPr>
+              <a:t>People's Liberation Army</a:t>
+            </a:r>
+            <a:r>
+              <a:rPr lang="en-US" sz="1200" b="0" i="0" kern="1200" dirty="0">
+                <a:solidFill>
+                  <a:schemeClr val="tx1"/>
+                </a:solidFill>
+                <a:effectLst/>
+                <a:latin typeface="+mn-lt"/>
+                <a:ea typeface="+mn-ea"/>
+                <a:cs typeface="+mn-cs"/>
+              </a:rPr>
+              <a:t> for hacking into Equifax and plundering sensitive data as part of a massive heist that also included stealing trade secrets, though the </a:t>
+            </a:r>
+            <a:r>
+              <a:rPr lang="en-US" sz="1200" b="0" i="0" u="none" strike="noStrike" kern="1200" dirty="0">
+                <a:solidFill>
+                  <a:schemeClr val="tx1"/>
+                </a:solidFill>
+                <a:effectLst/>
+                <a:latin typeface="+mn-lt"/>
+                <a:ea typeface="+mn-ea"/>
+                <a:cs typeface="+mn-cs"/>
+                <a:hlinkClick r:id="rId10" tooltip="Chinese Communist Party"/>
+              </a:rPr>
+              <a:t>Chinese Communist Party</a:t>
+            </a:r>
+            <a:r>
+              <a:rPr lang="en-US" sz="1200" b="0" i="0" kern="1200" dirty="0">
+                <a:solidFill>
+                  <a:schemeClr val="tx1"/>
+                </a:solidFill>
+                <a:effectLst/>
+                <a:latin typeface="+mn-lt"/>
+                <a:ea typeface="+mn-ea"/>
+                <a:cs typeface="+mn-cs"/>
+              </a:rPr>
+              <a:t> denied these claims.</a:t>
+            </a:r>
+            <a:r>
+              <a:rPr lang="en-US" sz="1200" b="0" i="0" u="none" strike="noStrike" kern="1200" baseline="30000" dirty="0">
+                <a:solidFill>
+                  <a:schemeClr val="tx1"/>
+                </a:solidFill>
+                <a:effectLst/>
+                <a:latin typeface="+mn-lt"/>
+                <a:ea typeface="+mn-ea"/>
+                <a:cs typeface="+mn-cs"/>
+                <a:hlinkClick r:id="rId11"/>
+              </a:rPr>
+              <a:t>[1]</a:t>
+            </a:r>
+            <a:r>
+              <a:rPr lang="en-US" sz="1200" b="0" i="0" u="none" strike="noStrike" kern="1200" baseline="30000" dirty="0">
+                <a:solidFill>
+                  <a:schemeClr val="tx1"/>
+                </a:solidFill>
+                <a:effectLst/>
+                <a:latin typeface="+mn-lt"/>
+                <a:ea typeface="+mn-ea"/>
+                <a:cs typeface="+mn-cs"/>
+                <a:hlinkClick r:id="rId12"/>
+              </a:rPr>
+              <a:t>[2]</a:t>
+            </a:r>
+            <a:endParaRPr lang="en-US" sz="1200" b="0" i="0" u="none" strike="noStrike" kern="1200" baseline="30000" dirty="0">
+              <a:solidFill>
+                <a:schemeClr val="tx1"/>
+              </a:solidFill>
+              <a:effectLst/>
+              <a:latin typeface="+mn-lt"/>
+              <a:ea typeface="+mn-ea"/>
+              <a:cs typeface="+mn-cs"/>
+            </a:endParaRPr>
+          </a:p>
+          <a:p>
+            <a:endParaRPr lang="en-US" dirty="0"/>
+          </a:p>
+        </p:txBody>
+      </p:sp>
+      <p:sp>
+        <p:nvSpPr>
+          <p:cNvPr id="4" name="Slide Number Placeholder 3"/>
+          <p:cNvSpPr>
+            <a:spLocks noGrp="1"/>
+          </p:cNvSpPr>
+          <p:nvPr>
+            <p:ph type="sldNum" sz="quarter" idx="5"/>
+          </p:nvPr>
+        </p:nvSpPr>
+        <p:spPr/>
+        <p:txBody>
+          <a:bodyPr/>
+          <a:lstStyle/>
+          <a:p>
+            <a:fld id="{A0C2BAE8-E3F0-0946-96E1-DB73165E9F51}" type="slidenum">
+              <a:rPr lang="en-US" smtClean="0"/>
+              <a:t>19</a:t>
+            </a:fld>
+            <a:endParaRPr lang="en-US"/>
+          </a:p>
+        </p:txBody>
+      </p:sp>
+    </p:spTree>
+    <p:extLst>
+      <p:ext uri="{BB962C8B-B14F-4D97-AF65-F5344CB8AC3E}">
+        <p14:creationId xmlns:p14="http://schemas.microsoft.com/office/powerpoint/2010/main" val="699651670"/>
+      </p:ext>
+    </p:extLst>
+  </p:cSld>
+  <p:clrMapOvr>
+    <a:masterClrMapping/>
+  </p:clrMapOvr>
+</p:notes>
+</file>
+
+<file path=ppt/notesSlides/notesSlide6.xml><?xml version="1.0" encoding="utf-8"?>
+<p:notes xmlns:a="http://schemas.openxmlformats.org/drawingml/2006/main" xmlns:r="http://schemas.openxmlformats.org/officeDocument/2006/relationships" xmlns:p="http://schemas.openxmlformats.org/presentationml/2006/main">
+  <p:cSld>
+    <p:spTree>
+      <p:nvGrpSpPr>
+        <p:cNvPr id="1" name=""/>
+        <p:cNvGrpSpPr/>
+        <p:nvPr/>
+      </p:nvGrpSpPr>
+      <p:grpSpPr>
+        <a:xfrm>
+          <a:off x="0" y="0"/>
+          <a:ext cx="0" cy="0"/>
+          <a:chOff x="0" y="0"/>
+          <a:chExt cx="0" cy="0"/>
+        </a:xfrm>
+      </p:grpSpPr>
+      <p:sp>
+        <p:nvSpPr>
+          <p:cNvPr id="2" name="Slide Image Placeholder 1"/>
+          <p:cNvSpPr>
+            <a:spLocks noGrp="1" noRot="1" noChangeAspect="1"/>
+          </p:cNvSpPr>
+          <p:nvPr>
+            <p:ph type="sldImg"/>
+          </p:nvPr>
+        </p:nvSpPr>
+        <p:spPr/>
+      </p:sp>
+      <p:sp>
+        <p:nvSpPr>
+          <p:cNvPr id="3" name="Notes Placeholder 2"/>
+          <p:cNvSpPr>
+            <a:spLocks noGrp="1"/>
+          </p:cNvSpPr>
+          <p:nvPr>
+            <p:ph type="body" idx="1"/>
+          </p:nvPr>
+        </p:nvSpPr>
+        <p:spPr/>
+        <p:txBody>
+          <a:bodyPr/>
+          <a:lstStyle/>
+          <a:p>
             <a:endParaRPr lang="en-US" sz="1200" b="0" i="0" u="none" strike="noStrike" kern="1200" baseline="30000" dirty="0">
               <a:solidFill>
                 <a:schemeClr val="tx1"/>
@@ -1265,7 +1438,7 @@
           <a:p>
             <a:fld id="{A0C2BAE8-E3F0-0946-96E1-DB73165E9F51}" type="slidenum">
               <a:rPr lang="en-US" smtClean="0"/>
-              <a:t>18</a:t>
+              <a:t>20</a:t>
             </a:fld>
             <a:endParaRPr lang="en-US"/>
           </a:p>
@@ -1463,7 +1636,7 @@
           <a:p>
             <a:fld id="{73517929-4004-2A4B-A9B9-6C42BFAE4953}" type="datetimeFigureOut">
               <a:rPr lang="en-US" smtClean="0"/>
-              <a:t>1/12/22</a:t>
+              <a:t>1/9/23</a:t>
             </a:fld>
             <a:endParaRPr lang="en-US"/>
           </a:p>
@@ -1631,7 +1804,7 @@
           <a:p>
             <a:fld id="{73517929-4004-2A4B-A9B9-6C42BFAE4953}" type="datetimeFigureOut">
               <a:rPr lang="en-US" smtClean="0"/>
-              <a:t>1/12/22</a:t>
+              <a:t>1/9/23</a:t>
             </a:fld>
             <a:endParaRPr lang="en-US"/>
           </a:p>
@@ -1809,7 +1982,7 @@
           <a:p>
             <a:fld id="{73517929-4004-2A4B-A9B9-6C42BFAE4953}" type="datetimeFigureOut">
               <a:rPr lang="en-US" smtClean="0"/>
-              <a:t>1/12/22</a:t>
+              <a:t>1/9/23</a:t>
             </a:fld>
             <a:endParaRPr lang="en-US"/>
           </a:p>
@@ -1977,7 +2150,7 @@
           <a:p>
             <a:fld id="{73517929-4004-2A4B-A9B9-6C42BFAE4953}" type="datetimeFigureOut">
               <a:rPr lang="en-US" smtClean="0"/>
-              <a:t>1/12/22</a:t>
+              <a:t>1/9/23</a:t>
             </a:fld>
             <a:endParaRPr lang="en-US"/>
           </a:p>
@@ -2222,7 +2395,7 @@
           <a:p>
             <a:fld id="{73517929-4004-2A4B-A9B9-6C42BFAE4953}" type="datetimeFigureOut">
               <a:rPr lang="en-US" smtClean="0"/>
-              <a:t>1/12/22</a:t>
+              <a:t>1/9/23</a:t>
             </a:fld>
             <a:endParaRPr lang="en-US"/>
           </a:p>
@@ -2507,7 +2680,7 @@
           <a:p>
             <a:fld id="{73517929-4004-2A4B-A9B9-6C42BFAE4953}" type="datetimeFigureOut">
               <a:rPr lang="en-US" smtClean="0"/>
-              <a:t>1/12/22</a:t>
+              <a:t>1/9/23</a:t>
             </a:fld>
             <a:endParaRPr lang="en-US"/>
           </a:p>
@@ -2926,7 +3099,7 @@
           <a:p>
             <a:fld id="{73517929-4004-2A4B-A9B9-6C42BFAE4953}" type="datetimeFigureOut">
               <a:rPr lang="en-US" smtClean="0"/>
-              <a:t>1/12/22</a:t>
+              <a:t>1/9/23</a:t>
             </a:fld>
             <a:endParaRPr lang="en-US"/>
           </a:p>
@@ -3043,7 +3216,7 @@
           <a:p>
             <a:fld id="{73517929-4004-2A4B-A9B9-6C42BFAE4953}" type="datetimeFigureOut">
               <a:rPr lang="en-US" smtClean="0"/>
-              <a:t>1/12/22</a:t>
+              <a:t>1/9/23</a:t>
             </a:fld>
             <a:endParaRPr lang="en-US"/>
           </a:p>
@@ -3138,7 +3311,7 @@
           <a:p>
             <a:fld id="{73517929-4004-2A4B-A9B9-6C42BFAE4953}" type="datetimeFigureOut">
               <a:rPr lang="en-US" smtClean="0"/>
-              <a:t>1/12/22</a:t>
+              <a:t>1/9/23</a:t>
             </a:fld>
             <a:endParaRPr lang="en-US"/>
           </a:p>
@@ -3413,7 +3586,7 @@
           <a:p>
             <a:fld id="{73517929-4004-2A4B-A9B9-6C42BFAE4953}" type="datetimeFigureOut">
               <a:rPr lang="en-US" smtClean="0"/>
-              <a:t>1/12/22</a:t>
+              <a:t>1/9/23</a:t>
             </a:fld>
             <a:endParaRPr lang="en-US"/>
           </a:p>
@@ -3665,7 +3838,7 @@
           <a:p>
             <a:fld id="{73517929-4004-2A4B-A9B9-6C42BFAE4953}" type="datetimeFigureOut">
               <a:rPr lang="en-US" smtClean="0"/>
-              <a:t>1/12/22</a:t>
+              <a:t>1/9/23</a:t>
             </a:fld>
             <a:endParaRPr lang="en-US"/>
           </a:p>
@@ -3876,7 +4049,7 @@
           <a:p>
             <a:fld id="{73517929-4004-2A4B-A9B9-6C42BFAE4953}" type="datetimeFigureOut">
               <a:rPr lang="en-US" smtClean="0"/>
-              <a:t>1/12/22</a:t>
+              <a:t>1/9/23</a:t>
             </a:fld>
             <a:endParaRPr lang="en-US"/>
           </a:p>
@@ -4353,7 +4526,13 @@
       </p:grpSpPr>
       <p:sp>
         <p:nvSpPr>
-          <p:cNvPr id="2" name="Title 1"/>
+          <p:cNvPr id="2" name="Title 1">
+            <a:extLst>
+              <a:ext uri="{FF2B5EF4-FFF2-40B4-BE49-F238E27FC236}">
+                <a16:creationId xmlns:a16="http://schemas.microsoft.com/office/drawing/2014/main" id="{13F80434-F4F8-7124-A76B-EAF47C48CB62}"/>
+              </a:ext>
+            </a:extLst>
+          </p:cNvPr>
           <p:cNvSpPr>
             <a:spLocks noGrp="1"/>
           </p:cNvSpPr>
@@ -4368,51 +4547,75 @@
           <a:p>
             <a:r>
               <a:rPr lang="en-US" dirty="0"/>
-              <a:t>Takeaways</a:t>
-            </a:r>
-          </a:p>
-        </p:txBody>
-      </p:sp>
-      <p:sp>
-        <p:nvSpPr>
-          <p:cNvPr id="3" name="Content Placeholder 2"/>
-          <p:cNvSpPr>
-            <a:spLocks noGrp="1"/>
-          </p:cNvSpPr>
-          <p:nvPr>
-            <p:ph idx="1"/>
-          </p:nvPr>
-        </p:nvSpPr>
-        <p:spPr/>
-        <p:txBody>
-          <a:bodyPr>
-            <a:normAutofit/>
-          </a:bodyPr>
-          <a:lstStyle/>
-          <a:p>
-            <a:r>
-              <a:rPr lang="en-US" sz="2800" dirty="0"/>
-              <a:t>Operating procedures often weakest link</a:t>
-            </a:r>
-          </a:p>
-          <a:p>
-            <a:r>
-              <a:rPr lang="en-US" sz="2800" dirty="0"/>
-              <a:t>Suppliers overestimate customers’ level of security design sophistication</a:t>
-            </a:r>
-          </a:p>
-          <a:p>
-            <a:r>
-              <a:rPr lang="en-US" sz="2800" dirty="0"/>
-              <a:t>Security functions implemented at application level often neglected</a:t>
-            </a:r>
-          </a:p>
-        </p:txBody>
-      </p:sp>
+              <a:t>Fundamental Errors</a:t>
+            </a:r>
+          </a:p>
+        </p:txBody>
+      </p:sp>
+      <p:pic>
+        <p:nvPicPr>
+          <p:cNvPr id="5" name="Picture 4">
+            <a:extLst>
+              <a:ext uri="{FF2B5EF4-FFF2-40B4-BE49-F238E27FC236}">
+                <a16:creationId xmlns:a16="http://schemas.microsoft.com/office/drawing/2014/main" id="{85B512FB-5C0D-5F41-01EF-92D0CB2BEBE9}"/>
+              </a:ext>
+            </a:extLst>
+          </p:cNvPr>
+          <p:cNvPicPr>
+            <a:picLocks noChangeAspect="1"/>
+          </p:cNvPicPr>
+          <p:nvPr/>
+        </p:nvPicPr>
+        <p:blipFill>
+          <a:blip r:embed="rId2"/>
+          <a:stretch>
+            <a:fillRect/>
+          </a:stretch>
+        </p:blipFill>
+        <p:spPr>
+          <a:xfrm>
+            <a:off x="365760" y="1063229"/>
+            <a:ext cx="5156200" cy="2616200"/>
+          </a:xfrm>
+          <a:prstGeom prst="rect">
+            <a:avLst/>
+          </a:prstGeom>
+        </p:spPr>
+      </p:pic>
+      <p:pic>
+        <p:nvPicPr>
+          <p:cNvPr id="6" name="Picture 5">
+            <a:extLst>
+              <a:ext uri="{FF2B5EF4-FFF2-40B4-BE49-F238E27FC236}">
+                <a16:creationId xmlns:a16="http://schemas.microsoft.com/office/drawing/2014/main" id="{D553A8D0-8806-357A-5E2A-7B48B3F51879}"/>
+              </a:ext>
+            </a:extLst>
+          </p:cNvPr>
+          <p:cNvPicPr>
+            <a:picLocks noChangeAspect="1"/>
+          </p:cNvPicPr>
+          <p:nvPr/>
+        </p:nvPicPr>
+        <p:blipFill>
+          <a:blip r:embed="rId3"/>
+          <a:stretch>
+            <a:fillRect/>
+          </a:stretch>
+        </p:blipFill>
+        <p:spPr>
+          <a:xfrm>
+            <a:off x="3351306" y="3704739"/>
+            <a:ext cx="5130800" cy="939800"/>
+          </a:xfrm>
+          <a:prstGeom prst="rect">
+            <a:avLst/>
+          </a:prstGeom>
+        </p:spPr>
+      </p:pic>
     </p:spTree>
     <p:extLst>
       <p:ext uri="{BB962C8B-B14F-4D97-AF65-F5344CB8AC3E}">
-        <p14:creationId xmlns:p14="http://schemas.microsoft.com/office/powerpoint/2010/main" val="4038771683"/>
+        <p14:creationId xmlns:p14="http://schemas.microsoft.com/office/powerpoint/2010/main" val="3951338005"/>
       </p:ext>
     </p:extLst>
   </p:cSld>
@@ -4441,6 +4644,209 @@
       </p:grpSpPr>
       <p:sp>
         <p:nvSpPr>
+          <p:cNvPr id="2" name="Title 1">
+            <a:extLst>
+              <a:ext uri="{FF2B5EF4-FFF2-40B4-BE49-F238E27FC236}">
+                <a16:creationId xmlns:a16="http://schemas.microsoft.com/office/drawing/2014/main" id="{685F7AF3-CCE8-27D4-955F-E8595198BB51}"/>
+              </a:ext>
+            </a:extLst>
+          </p:cNvPr>
+          <p:cNvSpPr>
+            <a:spLocks noGrp="1"/>
+          </p:cNvSpPr>
+          <p:nvPr>
+            <p:ph type="title"/>
+          </p:nvPr>
+        </p:nvSpPr>
+        <p:spPr/>
+        <p:txBody>
+          <a:bodyPr/>
+          <a:lstStyle/>
+          <a:p>
+            <a:r>
+              <a:rPr lang="en-US" dirty="0"/>
+              <a:t>Activity</a:t>
+            </a:r>
+          </a:p>
+        </p:txBody>
+      </p:sp>
+      <p:sp>
+        <p:nvSpPr>
+          <p:cNvPr id="3" name="Content Placeholder 2">
+            <a:extLst>
+              <a:ext uri="{FF2B5EF4-FFF2-40B4-BE49-F238E27FC236}">
+                <a16:creationId xmlns:a16="http://schemas.microsoft.com/office/drawing/2014/main" id="{71DB5FF8-B025-9198-BB84-9441D97C502E}"/>
+              </a:ext>
+            </a:extLst>
+          </p:cNvPr>
+          <p:cNvSpPr>
+            <a:spLocks noGrp="1"/>
+          </p:cNvSpPr>
+          <p:nvPr>
+            <p:ph idx="1"/>
+          </p:nvPr>
+        </p:nvSpPr>
+        <p:spPr/>
+        <p:txBody>
+          <a:bodyPr/>
+          <a:lstStyle/>
+          <a:p>
+            <a:r>
+              <a:rPr lang="en-US" dirty="0"/>
+              <a:t>Faulty software implementation</a:t>
+            </a:r>
+          </a:p>
+          <a:p>
+            <a:r>
+              <a:rPr lang="en-US" dirty="0"/>
+              <a:t>Cryptanalysis</a:t>
+            </a:r>
+          </a:p>
+          <a:p>
+            <a:r>
+              <a:rPr lang="en-US" dirty="0"/>
+              <a:t>Poor key management</a:t>
+            </a:r>
+          </a:p>
+          <a:p>
+            <a:r>
+              <a:rPr lang="en-US" dirty="0"/>
+              <a:t>Human factors / failure to estimate </a:t>
+            </a:r>
+            <a:r>
+              <a:rPr lang="en-US"/>
+              <a:t>user sophistication</a:t>
+            </a:r>
+            <a:endParaRPr lang="en-US" dirty="0"/>
+          </a:p>
+        </p:txBody>
+      </p:sp>
+    </p:spTree>
+    <p:extLst>
+      <p:ext uri="{BB962C8B-B14F-4D97-AF65-F5344CB8AC3E}">
+        <p14:creationId xmlns:p14="http://schemas.microsoft.com/office/powerpoint/2010/main" val="1358500555"/>
+      </p:ext>
+    </p:extLst>
+  </p:cSld>
+  <p:clrMapOvr>
+    <a:masterClrMapping/>
+  </p:clrMapOvr>
+</p:sld>
+</file>
+
+<file path=ppt/slides/slide12.xml><?xml version="1.0" encoding="utf-8"?>
+<p:sld xmlns:a="http://schemas.openxmlformats.org/drawingml/2006/main" xmlns:r="http://schemas.openxmlformats.org/officeDocument/2006/relationships" xmlns:p="http://schemas.openxmlformats.org/presentationml/2006/main">
+  <p:cSld>
+    <p:spTree>
+      <p:nvGrpSpPr>
+        <p:cNvPr id="1" name=""/>
+        <p:cNvGrpSpPr/>
+        <p:nvPr/>
+      </p:nvGrpSpPr>
+      <p:grpSpPr>
+        <a:xfrm>
+          <a:off x="0" y="0"/>
+          <a:ext cx="0" cy="0"/>
+          <a:chOff x="0" y="0"/>
+          <a:chExt cx="0" cy="0"/>
+        </a:xfrm>
+      </p:grpSpPr>
+      <p:sp>
+        <p:nvSpPr>
+          <p:cNvPr id="2" name="Title 1"/>
+          <p:cNvSpPr>
+            <a:spLocks noGrp="1"/>
+          </p:cNvSpPr>
+          <p:nvPr>
+            <p:ph type="title"/>
+          </p:nvPr>
+        </p:nvSpPr>
+        <p:spPr/>
+        <p:txBody>
+          <a:bodyPr/>
+          <a:lstStyle/>
+          <a:p>
+            <a:r>
+              <a:rPr lang="en-US" dirty="0"/>
+              <a:t>Takeaways</a:t>
+            </a:r>
+          </a:p>
+        </p:txBody>
+      </p:sp>
+      <p:sp>
+        <p:nvSpPr>
+          <p:cNvPr id="3" name="Content Placeholder 2"/>
+          <p:cNvSpPr>
+            <a:spLocks noGrp="1"/>
+          </p:cNvSpPr>
+          <p:nvPr>
+            <p:ph idx="1"/>
+          </p:nvPr>
+        </p:nvSpPr>
+        <p:spPr/>
+        <p:txBody>
+          <a:bodyPr>
+            <a:normAutofit/>
+          </a:bodyPr>
+          <a:lstStyle/>
+          <a:p>
+            <a:r>
+              <a:rPr lang="en-US" sz="2800" b="1" dirty="0"/>
+              <a:t>“The vast majority of security failures occur at the level of implementation detail.”</a:t>
+            </a:r>
+          </a:p>
+          <a:p>
+            <a:r>
+              <a:rPr lang="en-US" sz="2800" dirty="0"/>
+              <a:t>Operating procedures often weakest link</a:t>
+            </a:r>
+          </a:p>
+          <a:p>
+            <a:r>
+              <a:rPr lang="en-US" sz="2800" dirty="0"/>
+              <a:t>Suppliers overestimate customers’ level of security design sophistication</a:t>
+            </a:r>
+          </a:p>
+          <a:p>
+            <a:r>
+              <a:rPr lang="en-US" sz="2800" dirty="0"/>
+              <a:t>Security functions implemented at application level often neglected</a:t>
+            </a:r>
+          </a:p>
+        </p:txBody>
+      </p:sp>
+    </p:spTree>
+    <p:extLst>
+      <p:ext uri="{BB962C8B-B14F-4D97-AF65-F5344CB8AC3E}">
+        <p14:creationId xmlns:p14="http://schemas.microsoft.com/office/powerpoint/2010/main" val="4038771683"/>
+      </p:ext>
+    </p:extLst>
+  </p:cSld>
+  <p:clrMapOvr>
+    <a:masterClrMapping/>
+  </p:clrMapOvr>
+</p:sld>
+</file>
+
+<file path=ppt/slides/slide13.xml><?xml version="1.0" encoding="utf-8"?>
+<p:sld xmlns:a="http://schemas.openxmlformats.org/drawingml/2006/main" xmlns:r="http://schemas.openxmlformats.org/officeDocument/2006/relationships" xmlns:p="http://schemas.openxmlformats.org/presentationml/2006/main">
+  <p:cSld>
+    <p:spTree>
+      <p:nvGrpSpPr>
+        <p:cNvPr id="1" name=""/>
+        <p:cNvGrpSpPr/>
+        <p:nvPr/>
+      </p:nvGrpSpPr>
+      <p:grpSpPr>
+        <a:xfrm>
+          <a:off x="0" y="0"/>
+          <a:ext cx="0" cy="0"/>
+          <a:chOff x="0" y="0"/>
+          <a:chExt cx="0" cy="0"/>
+        </a:xfrm>
+      </p:grpSpPr>
+      <p:sp>
+        <p:nvSpPr>
           <p:cNvPr id="2" name="Title 1"/>
           <p:cNvSpPr>
             <a:spLocks noGrp="1"/>
@@ -4546,7 +4952,7 @@
 </p:sld>
 </file>
 
-<file path=ppt/slides/slide12.xml><?xml version="1.0" encoding="utf-8"?>
+<file path=ppt/slides/slide14.xml><?xml version="1.0" encoding="utf-8"?>
 <p:sld xmlns:a="http://schemas.openxmlformats.org/drawingml/2006/main" xmlns:r="http://schemas.openxmlformats.org/officeDocument/2006/relationships" xmlns:p="http://schemas.openxmlformats.org/presentationml/2006/main">
   <p:cSld>
     <p:spTree>
@@ -4600,7 +5006,7 @@
 </p:sld>
 </file>
 
-<file path=ppt/slides/slide13.xml><?xml version="1.0" encoding="utf-8"?>
+<file path=ppt/slides/slide15.xml><?xml version="1.0" encoding="utf-8"?>
 <p:sld xmlns:a="http://schemas.openxmlformats.org/drawingml/2006/main" xmlns:r="http://schemas.openxmlformats.org/officeDocument/2006/relationships" xmlns:p="http://schemas.openxmlformats.org/presentationml/2006/main">
   <p:cSld>
     <p:spTree>
@@ -4696,7 +5102,7 @@
 </p:sld>
 </file>
 
-<file path=ppt/slides/slide14.xml><?xml version="1.0" encoding="utf-8"?>
+<file path=ppt/slides/slide16.xml><?xml version="1.0" encoding="utf-8"?>
 <p:sld xmlns:a="http://schemas.openxmlformats.org/drawingml/2006/main" xmlns:r="http://schemas.openxmlformats.org/officeDocument/2006/relationships" xmlns:p="http://schemas.openxmlformats.org/presentationml/2006/main">
   <p:cSld>
     <p:spTree>
@@ -4880,7 +5286,7 @@
 </p:sld>
 </file>
 
-<file path=ppt/slides/slide15.xml><?xml version="1.0" encoding="utf-8"?>
+<file path=ppt/slides/slide17.xml><?xml version="1.0" encoding="utf-8"?>
 <p:sld xmlns:a="http://schemas.openxmlformats.org/drawingml/2006/main" xmlns:r="http://schemas.openxmlformats.org/officeDocument/2006/relationships" xmlns:p="http://schemas.openxmlformats.org/presentationml/2006/main">
   <p:cSld>
     <p:spTree>
@@ -4906,7 +5312,7 @@
           <p:nvPr/>
         </p:nvPicPr>
         <p:blipFill>
-          <a:blip r:embed="rId2"/>
+          <a:blip r:embed="rId3"/>
           <a:stretch>
             <a:fillRect/>
           </a:stretch>
@@ -4934,7 +5340,7 @@
 </p:sld>
 </file>
 
-<file path=ppt/slides/slide16.xml><?xml version="1.0" encoding="utf-8"?>
+<file path=ppt/slides/slide18.xml><?xml version="1.0" encoding="utf-8"?>
 <p:sld xmlns:a="http://schemas.openxmlformats.org/drawingml/2006/main" xmlns:r="http://schemas.openxmlformats.org/officeDocument/2006/relationships" xmlns:p="http://schemas.openxmlformats.org/presentationml/2006/main">
   <p:cSld>
     <p:spTree>
@@ -4994,7 +5400,7 @@
 </p:sld>
 </file>
 
-<file path=ppt/slides/slide17.xml><?xml version="1.0" encoding="utf-8"?>
+<file path=ppt/slides/slide19.xml><?xml version="1.0" encoding="utf-8"?>
 <p:sld xmlns:a="http://schemas.openxmlformats.org/drawingml/2006/main" xmlns:r="http://schemas.openxmlformats.org/officeDocument/2006/relationships" xmlns:p="http://schemas.openxmlformats.org/presentationml/2006/main">
   <p:cSld>
     <p:spTree>
@@ -5084,7 +5490,67 @@
 </p:sld>
 </file>
 
-<file path=ppt/slides/slide18.xml><?xml version="1.0" encoding="utf-8"?>
+<file path=ppt/slides/slide2.xml><?xml version="1.0" encoding="utf-8"?>
+<p:sld xmlns:a="http://schemas.openxmlformats.org/drawingml/2006/main" xmlns:r="http://schemas.openxmlformats.org/officeDocument/2006/relationships" xmlns:p="http://schemas.openxmlformats.org/presentationml/2006/main">
+  <p:cSld>
+    <p:spTree>
+      <p:nvGrpSpPr>
+        <p:cNvPr id="1" name=""/>
+        <p:cNvGrpSpPr/>
+        <p:nvPr/>
+      </p:nvGrpSpPr>
+      <p:grpSpPr>
+        <a:xfrm>
+          <a:off x="0" y="0"/>
+          <a:ext cx="0" cy="0"/>
+          <a:chOff x="0" y="0"/>
+          <a:chExt cx="0" cy="0"/>
+        </a:xfrm>
+      </p:grpSpPr>
+      <p:pic>
+        <p:nvPicPr>
+          <p:cNvPr id="4" name="Picture 3">
+            <a:extLst>
+              <a:ext uri="{FF2B5EF4-FFF2-40B4-BE49-F238E27FC236}">
+                <a16:creationId xmlns:a16="http://schemas.microsoft.com/office/drawing/2014/main" id="{EBB838E0-162F-344C-A643-5184119F2813}"/>
+              </a:ext>
+            </a:extLst>
+          </p:cNvPr>
+          <p:cNvPicPr>
+            <a:picLocks noChangeAspect="1"/>
+          </p:cNvPicPr>
+          <p:nvPr/>
+        </p:nvPicPr>
+        <p:blipFill>
+          <a:blip r:embed="rId3"/>
+          <a:stretch>
+            <a:fillRect/>
+          </a:stretch>
+        </p:blipFill>
+        <p:spPr>
+          <a:xfrm>
+            <a:off x="2711704" y="392683"/>
+            <a:ext cx="3460496" cy="4175887"/>
+          </a:xfrm>
+          <a:prstGeom prst="rect">
+            <a:avLst/>
+          </a:prstGeom>
+        </p:spPr>
+      </p:pic>
+    </p:spTree>
+    <p:extLst>
+      <p:ext uri="{BB962C8B-B14F-4D97-AF65-F5344CB8AC3E}">
+        <p14:creationId xmlns:p14="http://schemas.microsoft.com/office/powerpoint/2010/main" val="2371396521"/>
+      </p:ext>
+    </p:extLst>
+  </p:cSld>
+  <p:clrMapOvr>
+    <a:masterClrMapping/>
+  </p:clrMapOvr>
+</p:sld>
+</file>
+
+<file path=ppt/slides/slide20.xml><?xml version="1.0" encoding="utf-8"?>
 <p:sld xmlns:a="http://schemas.openxmlformats.org/drawingml/2006/main" xmlns:r="http://schemas.openxmlformats.org/officeDocument/2006/relationships" xmlns:p="http://schemas.openxmlformats.org/presentationml/2006/main">
   <p:cSld>
     <p:spTree>
@@ -5174,7 +5640,7 @@
 </p:sld>
 </file>
 
-<file path=ppt/slides/slide19.xml><?xml version="1.0" encoding="utf-8"?>
+<file path=ppt/slides/slide21.xml><?xml version="1.0" encoding="utf-8"?>
 <p:sld xmlns:a="http://schemas.openxmlformats.org/drawingml/2006/main" xmlns:r="http://schemas.openxmlformats.org/officeDocument/2006/relationships" xmlns:p="http://schemas.openxmlformats.org/presentationml/2006/main">
   <p:cSld>
     <p:spTree>
@@ -5264,67 +5730,7 @@
 </p:sld>
 </file>
 
-<file path=ppt/slides/slide2.xml><?xml version="1.0" encoding="utf-8"?>
-<p:sld xmlns:a="http://schemas.openxmlformats.org/drawingml/2006/main" xmlns:r="http://schemas.openxmlformats.org/officeDocument/2006/relationships" xmlns:p="http://schemas.openxmlformats.org/presentationml/2006/main">
-  <p:cSld>
-    <p:spTree>
-      <p:nvGrpSpPr>
-        <p:cNvPr id="1" name=""/>
-        <p:cNvGrpSpPr/>
-        <p:nvPr/>
-      </p:nvGrpSpPr>
-      <p:grpSpPr>
-        <a:xfrm>
-          <a:off x="0" y="0"/>
-          <a:ext cx="0" cy="0"/>
-          <a:chOff x="0" y="0"/>
-          <a:chExt cx="0" cy="0"/>
-        </a:xfrm>
-      </p:grpSpPr>
-      <p:pic>
-        <p:nvPicPr>
-          <p:cNvPr id="4" name="Picture 3">
-            <a:extLst>
-              <a:ext uri="{FF2B5EF4-FFF2-40B4-BE49-F238E27FC236}">
-                <a16:creationId xmlns:a16="http://schemas.microsoft.com/office/drawing/2014/main" id="{EBB838E0-162F-344C-A643-5184119F2813}"/>
-              </a:ext>
-            </a:extLst>
-          </p:cNvPr>
-          <p:cNvPicPr>
-            <a:picLocks noChangeAspect="1"/>
-          </p:cNvPicPr>
-          <p:nvPr/>
-        </p:nvPicPr>
-        <p:blipFill>
-          <a:blip r:embed="rId3"/>
-          <a:stretch>
-            <a:fillRect/>
-          </a:stretch>
-        </p:blipFill>
-        <p:spPr>
-          <a:xfrm>
-            <a:off x="2711704" y="392683"/>
-            <a:ext cx="3460496" cy="4175887"/>
-          </a:xfrm>
-          <a:prstGeom prst="rect">
-            <a:avLst/>
-          </a:prstGeom>
-        </p:spPr>
-      </p:pic>
-    </p:spTree>
-    <p:extLst>
-      <p:ext uri="{BB962C8B-B14F-4D97-AF65-F5344CB8AC3E}">
-        <p14:creationId xmlns:p14="http://schemas.microsoft.com/office/powerpoint/2010/main" val="2371396521"/>
-      </p:ext>
-    </p:extLst>
-  </p:cSld>
-  <p:clrMapOvr>
-    <a:masterClrMapping/>
-  </p:clrMapOvr>
-</p:sld>
-</file>
-
-<file path=ppt/slides/slide20.xml><?xml version="1.0" encoding="utf-8"?>
+<file path=ppt/slides/slide22.xml><?xml version="1.0" encoding="utf-8"?>
 <p:sld xmlns:a="http://schemas.openxmlformats.org/drawingml/2006/main" xmlns:r="http://schemas.openxmlformats.org/officeDocument/2006/relationships" xmlns:p="http://schemas.openxmlformats.org/presentationml/2006/main">
   <p:cSld>
     <p:spTree>
@@ -5889,10 +6295,15 @@
             <a:spLocks noGrp="1"/>
           </p:cNvSpPr>
           <p:nvPr>
-            <p:ph type="title"/>
-          </p:nvPr>
-        </p:nvSpPr>
-        <p:spPr/>
+            <p:ph type="title" idx="4294967295"/>
+          </p:nvPr>
+        </p:nvSpPr>
+        <p:spPr>
+          <a:xfrm>
+            <a:off x="0" y="206375"/>
+            <a:ext cx="8229600" cy="857250"/>
+          </a:xfrm>
+        </p:spPr>
         <p:txBody>
           <a:bodyPr/>
           <a:lstStyle/>
@@ -5911,10 +6322,15 @@
             <a:spLocks noGrp="1"/>
           </p:cNvSpPr>
           <p:nvPr>
-            <p:ph idx="1"/>
-          </p:nvPr>
-        </p:nvSpPr>
-        <p:spPr/>
+            <p:ph idx="4294967295"/>
+          </p:nvPr>
+        </p:nvSpPr>
+        <p:spPr>
+          <a:xfrm>
+            <a:off x="0" y="1200150"/>
+            <a:ext cx="8229600" cy="3394075"/>
+          </a:xfrm>
+        </p:spPr>
         <p:txBody>
           <a:bodyPr>
             <a:normAutofit lnSpcReduction="10000"/>

</xml_diff>